<commit_message>
Added third slide deck, experimental r script, etc.
</commit_message>
<xml_diff>
--- a/2022_Training_series_materials/Slide_Decks/RealWorldData_ABM_2022.pptx
+++ b/2022_Training_series_materials/Slide_Decks/RealWorldData_ABM_2022.pptx
@@ -5,20 +5,19 @@
     <p:sldMasterId id="2147483648" r:id="rId4"/>
   </p:sldMasterIdLst>
   <p:notesMasterIdLst>
-    <p:notesMasterId r:id="rId13"/>
+    <p:notesMasterId r:id="rId12"/>
   </p:notesMasterIdLst>
   <p:handoutMasterIdLst>
-    <p:handoutMasterId r:id="rId14"/>
+    <p:handoutMasterId r:id="rId13"/>
   </p:handoutMasterIdLst>
   <p:sldIdLst>
     <p:sldId id="261" r:id="rId5"/>
-    <p:sldId id="418" r:id="rId6"/>
-    <p:sldId id="275" r:id="rId7"/>
-    <p:sldId id="277" r:id="rId8"/>
-    <p:sldId id="435" r:id="rId9"/>
-    <p:sldId id="436" r:id="rId10"/>
-    <p:sldId id="414" r:id="rId11"/>
-    <p:sldId id="373" r:id="rId12"/>
+    <p:sldId id="277" r:id="rId6"/>
+    <p:sldId id="418" r:id="rId7"/>
+    <p:sldId id="435" r:id="rId8"/>
+    <p:sldId id="436" r:id="rId9"/>
+    <p:sldId id="414" r:id="rId10"/>
+    <p:sldId id="373" r:id="rId11"/>
   </p:sldIdLst>
   <p:sldSz cx="12192000" cy="6858000"/>
   <p:notesSz cx="6858000" cy="9144000"/>
@@ -131,7 +130,7 @@
 <file path=ppt/revisionInfo.xml><?xml version="1.0" encoding="utf-8"?>
 <p1510:revInfo xmlns:a="http://schemas.openxmlformats.org/drawingml/2006/main" xmlns:r="http://schemas.openxmlformats.org/officeDocument/2006/relationships" xmlns:p1510="http://schemas.microsoft.com/office/powerpoint/2015/10/main">
   <p1510:revLst>
-    <p1510:client id="{3E41C4F8-6243-4904-BF56-E2CE2CD1CF2D}" v="4" dt="2022-01-28T12:27:13.921"/>
+    <p1510:client id="{3E41C4F8-6243-4904-BF56-E2CE2CD1CF2D}" v="6" dt="2022-02-07T13:18:27.034"/>
   </p1510:revLst>
 </p1510:revInfo>
 </file>
@@ -218,7 +217,7 @@
           <a:p>
             <a:fld id="{59053542-6DB0-433F-A254-AEF992256B1C}" type="datetimeFigureOut">
               <a:rPr lang="en-GB" smtClean="0"/>
-              <a:t>28/01/2022</a:t>
+              <a:t>07/02/2022</a:t>
             </a:fld>
             <a:endParaRPr lang="en-GB"/>
           </a:p>
@@ -299,33 +298,6 @@
   </p:cSld>
   <p:clrMap bg1="lt1" tx1="dk1" bg2="lt2" tx2="dk2" accent1="accent1" accent2="accent2" accent3="accent3" accent4="accent4" accent5="accent5" accent6="accent6" hlink="hlink" folHlink="folHlink"/>
 </p:handoutMaster>
-</file>
-
-<file path=ppt/ink/ink1.xml><?xml version="1.0" encoding="utf-8"?>
-<inkml:ink xmlns:inkml="http://www.w3.org/2003/InkML">
-  <inkml:definitions>
-    <inkml:context xml:id="ctx0">
-      <inkml:inkSource xml:id="inkSrc0">
-        <inkml:traceFormat>
-          <inkml:channel name="X" type="integer" min="-2.14748E9" max="2.14748E9" units="cm"/>
-          <inkml:channel name="Y" type="integer" min="-2.14748E9" max="2.14748E9" units="cm"/>
-          <inkml:channel name="F" type="integer" max="32767" units="dev"/>
-        </inkml:traceFormat>
-        <inkml:channelProperties>
-          <inkml:channelProperty channel="X" name="resolution" value="1000" units="1/cm"/>
-          <inkml:channelProperty channel="Y" name="resolution" value="1000" units="1/cm"/>
-          <inkml:channelProperty channel="F" name="resolution" value="0" units="1/dev"/>
-        </inkml:channelProperties>
-      </inkml:inkSource>
-      <inkml:timestamp xml:id="ts0" timeString="2021-12-13T12:10:33.120"/>
-    </inkml:context>
-    <inkml:brush xml:id="br0">
-      <inkml:brushProperty name="width" value="0.05" units="cm"/>
-      <inkml:brushProperty name="height" value="0.05" units="cm"/>
-    </inkml:brush>
-  </inkml:definitions>
-  <inkml:trace contextRef="#ctx0" brushRef="#br0">44 13 2881,'0'0'1928,"-43"-12"-1880</inkml:trace>
-</inkml:ink>
 </file>
 
 <file path=ppt/notesMasters/notesMaster1.xml><?xml version="1.0" encoding="utf-8"?>
@@ -410,7 +382,7 @@
           <a:p>
             <a:fld id="{AE620EB2-56AE-4D49-92A2-200E9A3683D8}" type="datetimeFigureOut">
               <a:rPr lang="en-US" smtClean="0"/>
-              <a:t>1/28/2022</a:t>
+              <a:t>2/7/2022</a:t>
             </a:fld>
             <a:endParaRPr lang="en-US"/>
           </a:p>
@@ -678,90 +650,6 @@
 </p:notesMaster>
 </file>
 
-<file path=ppt/notesSlides/notesSlide1.xml><?xml version="1.0" encoding="utf-8"?>
-<p:notes xmlns:a="http://schemas.openxmlformats.org/drawingml/2006/main" xmlns:r="http://schemas.openxmlformats.org/officeDocument/2006/relationships" xmlns:p="http://schemas.openxmlformats.org/presentationml/2006/main">
-  <p:cSld>
-    <p:spTree>
-      <p:nvGrpSpPr>
-        <p:cNvPr id="1" name=""/>
-        <p:cNvGrpSpPr/>
-        <p:nvPr/>
-      </p:nvGrpSpPr>
-      <p:grpSpPr>
-        <a:xfrm>
-          <a:off x="0" y="0"/>
-          <a:ext cx="0" cy="0"/>
-          <a:chOff x="0" y="0"/>
-          <a:chExt cx="0" cy="0"/>
-        </a:xfrm>
-      </p:grpSpPr>
-      <p:sp>
-        <p:nvSpPr>
-          <p:cNvPr id="2" name="Slide Image Placeholder 1"/>
-          <p:cNvSpPr>
-            <a:spLocks noGrp="1" noRot="1" noChangeAspect="1"/>
-          </p:cNvSpPr>
-          <p:nvPr>
-            <p:ph type="sldImg"/>
-          </p:nvPr>
-        </p:nvSpPr>
-        <p:spPr/>
-      </p:sp>
-      <p:sp>
-        <p:nvSpPr>
-          <p:cNvPr id="3" name="Notes Placeholder 2"/>
-          <p:cNvSpPr>
-            <a:spLocks noGrp="1"/>
-          </p:cNvSpPr>
-          <p:nvPr>
-            <p:ph type="body" idx="1"/>
-          </p:nvPr>
-        </p:nvSpPr>
-        <p:spPr/>
-        <p:txBody>
-          <a:bodyPr/>
-          <a:lstStyle/>
-          <a:p>
-            <a:endParaRPr lang="en-GB"/>
-          </a:p>
-        </p:txBody>
-      </p:sp>
-      <p:sp>
-        <p:nvSpPr>
-          <p:cNvPr id="4" name="Slide Number Placeholder 3"/>
-          <p:cNvSpPr>
-            <a:spLocks noGrp="1"/>
-          </p:cNvSpPr>
-          <p:nvPr>
-            <p:ph type="sldNum" sz="quarter" idx="10"/>
-          </p:nvPr>
-        </p:nvSpPr>
-        <p:spPr/>
-        <p:txBody>
-          <a:bodyPr/>
-          <a:lstStyle/>
-          <a:p>
-            <a:fld id="{95D74495-12D2-6A47-A762-3590D56449EA}" type="slidenum">
-              <a:rPr lang="en-US" smtClean="0"/>
-              <a:t>3</a:t>
-            </a:fld>
-            <a:endParaRPr lang="en-US"/>
-          </a:p>
-        </p:txBody>
-      </p:sp>
-    </p:spTree>
-    <p:extLst>
-      <p:ext uri="{BB962C8B-B14F-4D97-AF65-F5344CB8AC3E}">
-        <p14:creationId xmlns:p14="http://schemas.microsoft.com/office/powerpoint/2010/main" val="1279738532"/>
-      </p:ext>
-    </p:extLst>
-  </p:cSld>
-  <p:clrMapOvr>
-    <a:masterClrMapping/>
-  </p:clrMapOvr>
-</p:notes>
-</file>
-
 <file path=ppt/slideLayouts/slideLayout1.xml><?xml version="1.0" encoding="utf-8"?>
 <p:sldLayout xmlns:a="http://schemas.openxmlformats.org/drawingml/2006/main" xmlns:r="http://schemas.openxmlformats.org/officeDocument/2006/relationships" xmlns:p="http://schemas.openxmlformats.org/presentationml/2006/main" preserve="1" userDrawn="1">
   <p:cSld name="Cover Slide">
@@ -1214,7 +1102,7 @@
           <a:p>
             <a:fld id="{7AB3EE13-5FCB-9C42-A93B-39A2047ADC20}" type="datetime1">
               <a:rPr lang="en-GB" smtClean="0"/>
-              <a:t>28/01/2022</a:t>
+              <a:t>07/02/2022</a:t>
             </a:fld>
             <a:endParaRPr lang="en-US" dirty="0"/>
           </a:p>
@@ -1546,7 +1434,7 @@
           <a:p>
             <a:fld id="{9059AB2C-4B99-BA49-A1DA-3174DB9E16C4}" type="datetime1">
               <a:rPr lang="en-GB" smtClean="0"/>
-              <a:t>28/01/2022</a:t>
+              <a:t>07/02/2022</a:t>
             </a:fld>
             <a:endParaRPr lang="en-US" dirty="0"/>
           </a:p>
@@ -1992,7 +1880,7 @@
           <a:p>
             <a:fld id="{EFE0CEC1-651B-7546-AFA1-0AE5803C80CE}" type="datetime1">
               <a:rPr lang="en-GB" smtClean="0"/>
-              <a:t>28/01/2022</a:t>
+              <a:t>07/02/2022</a:t>
             </a:fld>
             <a:endParaRPr lang="en-US" dirty="0"/>
           </a:p>
@@ -2405,7 +2293,7 @@
           <a:p>
             <a:fld id="{EFE0CEC1-651B-7546-AFA1-0AE5803C80CE}" type="datetime1">
               <a:rPr lang="en-GB" smtClean="0"/>
-              <a:t>28/01/2022</a:t>
+              <a:t>07/02/2022</a:t>
             </a:fld>
             <a:endParaRPr lang="en-US" dirty="0"/>
           </a:p>
@@ -3111,7 +2999,7 @@
           <a:p>
             <a:fld id="{0715BF9A-A25A-9E44-AC24-21CF2156EB06}" type="datetime1">
               <a:rPr lang="en-GB" smtClean="0"/>
-              <a:t>28/01/2022</a:t>
+              <a:t>07/02/2022</a:t>
             </a:fld>
             <a:endParaRPr lang="en-US"/>
           </a:p>
@@ -3817,7 +3705,7 @@
           <a:p>
             <a:fld id="{4503D537-DB89-2741-879E-E6FBC377CB7F}" type="datetime1">
               <a:rPr lang="en-GB" smtClean="0"/>
-              <a:t>28/01/2022</a:t>
+              <a:t>07/02/2022</a:t>
             </a:fld>
             <a:endParaRPr lang="en-US"/>
           </a:p>
@@ -4520,7 +4408,7 @@
           <a:p>
             <a:fld id="{A4096729-12C7-6847-AF20-30EC9E9095B0}" type="datetime1">
               <a:rPr lang="en-GB" smtClean="0"/>
-              <a:t>28/01/2022</a:t>
+              <a:t>07/02/2022</a:t>
             </a:fld>
             <a:endParaRPr lang="en-US"/>
           </a:p>
@@ -4832,7 +4720,7 @@
           <a:p>
             <a:fld id="{01026011-5817-4C4F-8C54-ED4A8F32D78D}" type="datetime1">
               <a:rPr lang="en-GB" smtClean="0"/>
-              <a:t>28/01/2022</a:t>
+              <a:t>07/02/2022</a:t>
             </a:fld>
             <a:endParaRPr lang="en-US"/>
           </a:p>
@@ -5294,7 +5182,7 @@
           <a:p>
             <a:fld id="{57AD4DEB-400B-2F47-8EA9-BED2FF45862A}" type="datetime1">
               <a:rPr lang="en-GB" smtClean="0"/>
-              <a:t>28/01/2022</a:t>
+              <a:t>07/02/2022</a:t>
             </a:fld>
             <a:endParaRPr lang="en-US"/>
           </a:p>
@@ -5440,7 +5328,7 @@
           <a:p>
             <a:fld id="{F617DED8-4350-C740-BB7C-D6C45B1EB394}" type="datetime1">
               <a:rPr lang="en-GB" smtClean="0"/>
-              <a:t>28/01/2022</a:t>
+              <a:t>07/02/2022</a:t>
             </a:fld>
             <a:endParaRPr lang="en-US"/>
           </a:p>
@@ -5960,7 +5848,7 @@
           <a:p>
             <a:fld id="{6B019124-9FEE-F749-B64E-9F79989DAC2E}" type="datetime1">
               <a:rPr lang="en-GB" smtClean="0"/>
-              <a:t>28/01/2022</a:t>
+              <a:t>07/02/2022</a:t>
             </a:fld>
             <a:endParaRPr lang="en-US"/>
           </a:p>
@@ -6301,7 +6189,7 @@
           <a:p>
             <a:fld id="{B215A42F-436F-F945-AF86-C545F1275288}" type="datetime1">
               <a:rPr lang="en-GB" smtClean="0"/>
-              <a:t>28/01/2022</a:t>
+              <a:t>07/02/2022</a:t>
             </a:fld>
             <a:endParaRPr lang="en-US" dirty="0"/>
           </a:p>
@@ -6682,7 +6570,7 @@
           <a:p>
             <a:fld id="{121B5539-A31E-E445-B370-3EE7B5028308}" type="datetime1">
               <a:rPr lang="en-GB" smtClean="0"/>
-              <a:t>28/01/2022</a:t>
+              <a:t>07/02/2022</a:t>
             </a:fld>
             <a:endParaRPr lang="en-US"/>
           </a:p>
@@ -7057,7 +6945,7 @@
           <a:p>
             <a:fld id="{45591B23-550B-D34F-BD1A-05839C075451}" type="datetime1">
               <a:rPr lang="en-GB" smtClean="0"/>
-              <a:t>28/01/2022</a:t>
+              <a:t>07/02/2022</a:t>
             </a:fld>
             <a:endParaRPr lang="en-US"/>
           </a:p>
@@ -7210,7 +7098,7 @@
           <a:p>
             <a:fld id="{45591B23-550B-D34F-BD1A-05839C075451}" type="datetime1">
               <a:rPr lang="en-GB" smtClean="0"/>
-              <a:t>28/01/2022</a:t>
+              <a:t>07/02/2022</a:t>
             </a:fld>
             <a:endParaRPr lang="en-US"/>
           </a:p>
@@ -7564,7 +7452,7 @@
           <a:p>
             <a:fld id="{49289C17-556E-C046-A339-146F08853335}" type="datetime1">
               <a:rPr lang="en-GB" smtClean="0"/>
-              <a:t>28/01/2022</a:t>
+              <a:t>07/02/2022</a:t>
             </a:fld>
             <a:endParaRPr lang="en-US"/>
           </a:p>
@@ -7772,7 +7660,7 @@
           <a:p>
             <a:fld id="{0A4E35E5-3497-504C-90EE-ACD012EC1750}" type="datetime1">
               <a:rPr lang="en-GB" smtClean="0"/>
-              <a:t>28/01/2022</a:t>
+              <a:t>07/02/2022</a:t>
             </a:fld>
             <a:endParaRPr lang="en-US"/>
           </a:p>
@@ -7836,189 +7724,6 @@
     <p:extLst>
       <p:ext uri="{BB962C8B-B14F-4D97-AF65-F5344CB8AC3E}">
         <p14:creationId xmlns:p14="http://schemas.microsoft.com/office/powerpoint/2010/main" val="268194900"/>
-      </p:ext>
-    </p:extLst>
-  </p:cSld>
-  <p:clrMapOvr>
-    <a:masterClrMapping/>
-  </p:clrMapOvr>
-</p:sldLayout>
-</file>
-
-<file path=ppt/slideLayouts/slideLayout25.xml><?xml version="1.0" encoding="utf-8"?>
-<p:sldLayout xmlns:a="http://schemas.openxmlformats.org/drawingml/2006/main" xmlns:r="http://schemas.openxmlformats.org/officeDocument/2006/relationships" xmlns:p="http://schemas.openxmlformats.org/presentationml/2006/main" userDrawn="1">
-  <p:cSld name="3_Two Content">
-    <p:spTree>
-      <p:nvGrpSpPr>
-        <p:cNvPr id="1" name=""/>
-        <p:cNvGrpSpPr/>
-        <p:nvPr/>
-      </p:nvGrpSpPr>
-      <p:grpSpPr>
-        <a:xfrm>
-          <a:off x="0" y="0"/>
-          <a:ext cx="0" cy="0"/>
-          <a:chOff x="0" y="0"/>
-          <a:chExt cx="0" cy="0"/>
-        </a:xfrm>
-      </p:grpSpPr>
-      <p:pic>
-        <p:nvPicPr>
-          <p:cNvPr id="13" name="Picture 12" descr="&quot; &quot;">
-            <a:extLst>
-              <a:ext uri="{FF2B5EF4-FFF2-40B4-BE49-F238E27FC236}">
-                <a16:creationId xmlns:a16="http://schemas.microsoft.com/office/drawing/2014/main" id="{130685FF-8861-7240-BA53-FA31C6C9C27B}"/>
-              </a:ext>
-            </a:extLst>
-          </p:cNvPr>
-          <p:cNvPicPr>
-            <a:picLocks noChangeAspect="1"/>
-          </p:cNvPicPr>
-          <p:nvPr userDrawn="1"/>
-        </p:nvPicPr>
-        <p:blipFill>
-          <a:blip r:embed="rId2"/>
-          <a:stretch>
-            <a:fillRect/>
-          </a:stretch>
-        </p:blipFill>
-        <p:spPr>
-          <a:xfrm>
-            <a:off x="8610600" y="3099873"/>
-            <a:ext cx="3594462" cy="3594462"/>
-          </a:xfrm>
-          <a:prstGeom prst="rect">
-            <a:avLst/>
-          </a:prstGeom>
-        </p:spPr>
-      </p:pic>
-      <p:sp>
-        <p:nvSpPr>
-          <p:cNvPr id="5" name="Date Placeholder 4">
-            <a:extLst>
-              <a:ext uri="{FF2B5EF4-FFF2-40B4-BE49-F238E27FC236}">
-                <a16:creationId xmlns:a16="http://schemas.microsoft.com/office/drawing/2014/main" id="{8396E716-C6D3-7140-8AC0-DDCC0A368FE6}"/>
-              </a:ext>
-            </a:extLst>
-          </p:cNvPr>
-          <p:cNvSpPr>
-            <a:spLocks noGrp="1"/>
-          </p:cNvSpPr>
-          <p:nvPr>
-            <p:ph type="dt" sz="half" idx="10"/>
-          </p:nvPr>
-        </p:nvSpPr>
-        <p:spPr/>
-        <p:txBody>
-          <a:bodyPr/>
-          <a:lstStyle/>
-          <a:p>
-            <a:fld id="{BC2AF70C-7487-5D49-97F3-B37681DB2E7A}" type="datetime1">
-              <a:rPr lang="en-GB" smtClean="0"/>
-              <a:t>28/01/2022</a:t>
-            </a:fld>
-            <a:endParaRPr lang="en-US" dirty="0"/>
-          </a:p>
-        </p:txBody>
-      </p:sp>
-      <p:sp>
-        <p:nvSpPr>
-          <p:cNvPr id="6" name="Footer Placeholder 5">
-            <a:extLst>
-              <a:ext uri="{FF2B5EF4-FFF2-40B4-BE49-F238E27FC236}">
-                <a16:creationId xmlns:a16="http://schemas.microsoft.com/office/drawing/2014/main" id="{0933742A-7D36-C84C-82B7-F28431F11E76}"/>
-              </a:ext>
-            </a:extLst>
-          </p:cNvPr>
-          <p:cNvSpPr>
-            <a:spLocks noGrp="1"/>
-          </p:cNvSpPr>
-          <p:nvPr>
-            <p:ph type="ftr" sz="quarter" idx="11"/>
-          </p:nvPr>
-        </p:nvSpPr>
-        <p:spPr/>
-        <p:txBody>
-          <a:bodyPr/>
-          <a:lstStyle/>
-          <a:p>
-            <a:endParaRPr lang="en-US" dirty="0"/>
-          </a:p>
-        </p:txBody>
-      </p:sp>
-      <p:sp>
-        <p:nvSpPr>
-          <p:cNvPr id="7" name="Slide Number Placeholder 6">
-            <a:extLst>
-              <a:ext uri="{FF2B5EF4-FFF2-40B4-BE49-F238E27FC236}">
-                <a16:creationId xmlns:a16="http://schemas.microsoft.com/office/drawing/2014/main" id="{3EFA0B6A-A6F4-6C45-A2B9-16CA5FF6523D}"/>
-              </a:ext>
-            </a:extLst>
-          </p:cNvPr>
-          <p:cNvSpPr>
-            <a:spLocks noGrp="1"/>
-          </p:cNvSpPr>
-          <p:nvPr>
-            <p:ph type="sldNum" sz="quarter" idx="12"/>
-          </p:nvPr>
-        </p:nvSpPr>
-        <p:spPr/>
-        <p:txBody>
-          <a:bodyPr/>
-          <a:lstStyle/>
-          <a:p>
-            <a:fld id="{016687C5-7511-7743-B429-3BDBE272F28B}" type="slidenum">
-              <a:rPr lang="en-US" smtClean="0"/>
-              <a:t>‹#›</a:t>
-            </a:fld>
-            <a:endParaRPr lang="en-US" dirty="0"/>
-          </a:p>
-        </p:txBody>
-      </p:sp>
-      <p:sp>
-        <p:nvSpPr>
-          <p:cNvPr id="10" name="Title 1">
-            <a:extLst>
-              <a:ext uri="{FF2B5EF4-FFF2-40B4-BE49-F238E27FC236}">
-                <a16:creationId xmlns:a16="http://schemas.microsoft.com/office/drawing/2014/main" id="{0CBA2EDF-5ADA-2A43-803A-5C04DEC2ACCE}"/>
-              </a:ext>
-            </a:extLst>
-          </p:cNvPr>
-          <p:cNvSpPr>
-            <a:spLocks noGrp="1"/>
-          </p:cNvSpPr>
-          <p:nvPr>
-            <p:ph type="title"/>
-          </p:nvPr>
-        </p:nvSpPr>
-        <p:spPr>
-          <a:xfrm>
-            <a:off x="838200" y="365125"/>
-            <a:ext cx="9977271" cy="548819"/>
-          </a:xfrm>
-        </p:spPr>
-        <p:txBody>
-          <a:bodyPr>
-            <a:noAutofit/>
-          </a:bodyPr>
-          <a:lstStyle>
-            <a:lvl1pPr>
-              <a:defRPr sz="4500"/>
-            </a:lvl1pPr>
-          </a:lstStyle>
-          <a:p>
-            <a:r>
-              <a:rPr lang="en-US"/>
-              <a:t>Click to edit Master title style</a:t>
-            </a:r>
-            <a:endParaRPr lang="en-US" dirty="0"/>
-          </a:p>
-        </p:txBody>
-      </p:sp>
-    </p:spTree>
-    <p:extLst>
-      <p:ext uri="{BB962C8B-B14F-4D97-AF65-F5344CB8AC3E}">
-        <p14:creationId xmlns:p14="http://schemas.microsoft.com/office/powerpoint/2010/main" val="2694238323"/>
       </p:ext>
     </p:extLst>
   </p:cSld>
@@ -8194,7 +7899,7 @@
           <a:p>
             <a:fld id="{F617DED8-4350-C740-BB7C-D6C45B1EB394}" type="datetime1">
               <a:rPr lang="en-GB" smtClean="0"/>
-              <a:t>28/01/2022</a:t>
+              <a:t>07/02/2022</a:t>
             </a:fld>
             <a:endParaRPr lang="en-US"/>
           </a:p>
@@ -8432,7 +8137,7 @@
           <a:p>
             <a:fld id="{F617DED8-4350-C740-BB7C-D6C45B1EB394}" type="datetime1">
               <a:rPr lang="en-GB" smtClean="0"/>
-              <a:t>28/01/2022</a:t>
+              <a:t>07/02/2022</a:t>
             </a:fld>
             <a:endParaRPr lang="en-US"/>
           </a:p>
@@ -8696,7 +8401,7 @@
           <a:p>
             <a:fld id="{F617DED8-4350-C740-BB7C-D6C45B1EB394}" type="datetime1">
               <a:rPr lang="en-GB" smtClean="0"/>
-              <a:t>28/01/2022</a:t>
+              <a:t>07/02/2022</a:t>
             </a:fld>
             <a:endParaRPr lang="en-US"/>
           </a:p>
@@ -8955,7 +8660,7 @@
           <a:p>
             <a:fld id="{BC2AF70C-7487-5D49-97F3-B37681DB2E7A}" type="datetime1">
               <a:rPr lang="en-GB" smtClean="0"/>
-              <a:t>28/01/2022</a:t>
+              <a:t>07/02/2022</a:t>
             </a:fld>
             <a:endParaRPr lang="en-US" dirty="0"/>
           </a:p>
@@ -9227,7 +8932,7 @@
           <a:p>
             <a:fld id="{98024559-C37D-F943-A0B6-3EDAAF776624}" type="datetime1">
               <a:rPr lang="en-GB" smtClean="0"/>
-              <a:t>28/01/2022</a:t>
+              <a:t>07/02/2022</a:t>
             </a:fld>
             <a:endParaRPr lang="en-US"/>
           </a:p>
@@ -9413,7 +9118,7 @@
           <a:p>
             <a:fld id="{98024559-C37D-F943-A0B6-3EDAAF776624}" type="datetime1">
               <a:rPr lang="en-GB" smtClean="0"/>
-              <a:t>28/01/2022</a:t>
+              <a:t>07/02/2022</a:t>
             </a:fld>
             <a:endParaRPr lang="en-US"/>
           </a:p>
@@ -9806,7 +9511,7 @@
           <a:p>
             <a:fld id="{9059AB2C-4B99-BA49-A1DA-3174DB9E16C4}" type="datetime1">
               <a:rPr lang="en-GB" smtClean="0"/>
-              <a:t>28/01/2022</a:t>
+              <a:t>07/02/2022</a:t>
             </a:fld>
             <a:endParaRPr lang="en-US" dirty="0"/>
           </a:p>
@@ -10050,7 +9755,7 @@
           <a:p>
             <a:fld id="{94F93ADD-E702-C74C-B2F2-777AA750DCF5}" type="datetime1">
               <a:rPr lang="en-GB" smtClean="0"/>
-              <a:t>28/01/2022</a:t>
+              <a:t>07/02/2022</a:t>
             </a:fld>
             <a:endParaRPr lang="en-US" dirty="0"/>
           </a:p>
@@ -10182,7 +9887,6 @@
     <p:sldLayoutId id="2147483678" r:id="rId22"/>
     <p:sldLayoutId id="2147483658" r:id="rId23"/>
     <p:sldLayoutId id="2147483659" r:id="rId24"/>
-    <p:sldLayoutId id="2147483716" r:id="rId25"/>
   </p:sldLayoutIdLst>
   <p:hf hdr="0" ftr="0" dt="0"/>
   <p:txStyles>
@@ -10588,6 +10292,9 @@
               <a:ext uri="{FF2B5EF4-FFF2-40B4-BE49-F238E27FC236}">
                 <a16:creationId xmlns:a16="http://schemas.microsoft.com/office/drawing/2014/main" id="{89B40B0B-BDD4-934E-8690-7D00D9EAE6BA}"/>
               </a:ext>
+              <a:ext uri="{C183D7F6-B498-43B3-948B-1728B52AA6E4}">
+                <adec:decorative xmlns:adec="http://schemas.microsoft.com/office/drawing/2017/decorative" val="1"/>
+              </a:ext>
             </a:extLst>
           </p:cNvPr>
           <p:cNvSpPr>
@@ -10612,10 +10319,13 @@
       </p:sp>
       <p:pic>
         <p:nvPicPr>
-          <p:cNvPr id="7" name="Picture Placeholder 5" descr="People walking in a busy unnamed location">
+          <p:cNvPr id="7" name="Picture Placeholder 5">
             <a:extLst>
               <a:ext uri="{FF2B5EF4-FFF2-40B4-BE49-F238E27FC236}">
                 <a16:creationId xmlns:a16="http://schemas.microsoft.com/office/drawing/2014/main" id="{081F8F27-1C23-DE44-B435-0913D52578A2}"/>
+              </a:ext>
+              <a:ext uri="{C183D7F6-B498-43B3-948B-1728B52AA6E4}">
+                <adec:decorative xmlns:adec="http://schemas.microsoft.com/office/drawing/2017/decorative" val="1"/>
               </a:ext>
             </a:extLst>
           </p:cNvPr>
@@ -10637,7 +10347,13 @@
       </p:pic>
       <p:pic>
         <p:nvPicPr>
-          <p:cNvPr id="8" name="Picture 6" descr="&quot; &quot;&#10;&#10;"/>
+          <p:cNvPr id="8" name="Picture 6">
+            <a:extLst>
+              <a:ext uri="{C183D7F6-B498-43B3-948B-1728B52AA6E4}">
+                <adec:decorative xmlns:adec="http://schemas.microsoft.com/office/drawing/2017/decorative" val="1"/>
+              </a:ext>
+            </a:extLst>
+          </p:cNvPr>
           <p:cNvPicPr>
             <a:picLocks noGrp="1" noChangeAspect="1" noChangeArrowheads="1"/>
           </p:cNvPicPr>
@@ -10747,57 +10463,6 @@
           </a:p>
         </p:txBody>
       </p:sp>
-      <mc:AlternateContent xmlns:mc="http://schemas.openxmlformats.org/markup-compatibility/2006" xmlns:p14="http://schemas.microsoft.com/office/powerpoint/2010/main">
-        <mc:Choice Requires="p14">
-          <p:contentPart p14:bwMode="auto" r:id="rId4">
-            <p14:nvContentPartPr>
-              <p14:cNvPr id="2" name="Ink 1">
-                <a:extLst>
-                  <a:ext uri="{FF2B5EF4-FFF2-40B4-BE49-F238E27FC236}">
-                    <a16:creationId xmlns:a16="http://schemas.microsoft.com/office/drawing/2014/main" id="{BB5E2D81-0948-40C0-AE85-79B8351A43D8}"/>
-                  </a:ext>
-                </a:extLst>
-              </p14:cNvPr>
-              <p14:cNvContentPartPr/>
-              <p14:nvPr/>
-            </p14:nvContentPartPr>
-            <p14:xfrm>
-              <a:off x="1101109" y="1862542"/>
-              <a:ext cx="16200" cy="4680"/>
-            </p14:xfrm>
-          </p:contentPart>
-        </mc:Choice>
-        <mc:Fallback xmlns="">
-          <p:pic>
-            <p:nvPicPr>
-              <p:cNvPr id="2" name="Ink 1">
-                <a:extLst>
-                  <a:ext uri="{FF2B5EF4-FFF2-40B4-BE49-F238E27FC236}">
-                    <a16:creationId xmlns:a16="http://schemas.microsoft.com/office/drawing/2014/main" id="{BB5E2D81-0948-40C0-AE85-79B8351A43D8}"/>
-                  </a:ext>
-                </a:extLst>
-              </p:cNvPr>
-              <p:cNvPicPr/>
-              <p:nvPr/>
-            </p:nvPicPr>
-            <p:blipFill>
-              <a:blip r:embed="rId5"/>
-              <a:stretch>
-                <a:fillRect/>
-              </a:stretch>
-            </p:blipFill>
-            <p:spPr>
-              <a:xfrm>
-                <a:off x="1092469" y="1853902"/>
-                <a:ext cx="33840" cy="22320"/>
-              </a:xfrm>
-              <a:prstGeom prst="rect">
-                <a:avLst/>
-              </a:prstGeom>
-            </p:spPr>
-          </p:pic>
-        </mc:Fallback>
-      </mc:AlternateContent>
     </p:spTree>
     <p:extLst>
       <p:ext uri="{BB962C8B-B14F-4D97-AF65-F5344CB8AC3E}">
@@ -10845,7 +10510,7 @@
           <a:p>
             <a:r>
               <a:rPr lang="en-GB" sz="3600" dirty="0"/>
-              <a:t>Interaction in this workshop</a:t>
+              <a:t>Troubleshooting audio problems</a:t>
             </a:r>
           </a:p>
         </p:txBody>
@@ -10862,27 +10527,47 @@
         </p:nvSpPr>
         <p:spPr/>
         <p:txBody>
-          <a:bodyPr vert="horz" lIns="91440" tIns="45720" rIns="91440" bIns="45720" rtlCol="0" anchor="t">
-            <a:noAutofit/>
+          <a:bodyPr>
+            <a:normAutofit/>
           </a:bodyPr>
           <a:lstStyle/>
           <a:p>
             <a:r>
-              <a:rPr lang="en-GB" sz="3200" dirty="0">
-                <a:latin typeface="+mn-lt"/>
-                <a:cs typeface="Arial"/>
-              </a:rPr>
-              <a:t>Zoom chat -&gt; technical questions for facilitator</a:t>
-            </a:r>
-          </a:p>
-          <a:p>
-            <a:r>
-              <a:rPr lang="en-GB" sz="3200" dirty="0">
-                <a:latin typeface="+mn-lt"/>
-                <a:cs typeface="Arial"/>
-              </a:rPr>
-              <a:t>Zoom Q&amp;A -&gt; content questions for the host, upvote questions of others</a:t>
-            </a:r>
+              <a:rPr lang="en-GB" sz="3200" dirty="0"/>
+              <a:t>Check your speaker/headset is plugged in / volume is on.</a:t>
+            </a:r>
+          </a:p>
+          <a:p>
+            <a:r>
+              <a:rPr lang="en-GB" sz="3200" dirty="0"/>
+              <a:t>Click on audio to change to listening via phone</a:t>
+            </a:r>
+          </a:p>
+          <a:p>
+            <a:r>
+              <a:rPr lang="en-GB" sz="3200" dirty="0"/>
+              <a:t>We are recording this workshop and will post it on YouTube (also </a:t>
+            </a:r>
+            <a:r>
+              <a:rPr lang="en-GB" sz="3200"/>
+              <a:t>live streaming there now)</a:t>
+            </a:r>
+            <a:endParaRPr lang="en-GB" sz="3200" dirty="0"/>
+          </a:p>
+          <a:p>
+            <a:pPr marL="0" indent="0">
+              <a:buNone/>
+            </a:pPr>
+            <a:r>
+              <a:rPr lang="en-GB" sz="3000" dirty="0"/>
+              <a:t>(https://www.youtube.com/user/UKDATASERVICE)</a:t>
+            </a:r>
+          </a:p>
+          <a:p>
+            <a:pPr marL="0" indent="0">
+              <a:buNone/>
+            </a:pPr>
+            <a:endParaRPr lang="en-GB" sz="3200" dirty="0"/>
           </a:p>
         </p:txBody>
       </p:sp>
@@ -10912,7 +10597,7 @@
     </p:spTree>
     <p:extLst>
       <p:ext uri="{BB962C8B-B14F-4D97-AF65-F5344CB8AC3E}">
-        <p14:creationId xmlns:p14="http://schemas.microsoft.com/office/powerpoint/2010/main" val="3795667852"/>
+        <p14:creationId xmlns:p14="http://schemas.microsoft.com/office/powerpoint/2010/main" val="2198104458"/>
       </p:ext>
     </p:extLst>
   </p:cSld>
@@ -10941,7 +10626,7 @@
       </p:grpSpPr>
       <p:sp>
         <p:nvSpPr>
-          <p:cNvPr id="3" name="Title 2"/>
+          <p:cNvPr id="2" name="Title 1"/>
           <p:cNvSpPr>
             <a:spLocks noGrp="1"/>
           </p:cNvSpPr>
@@ -10951,90 +10636,55 @@
         </p:nvSpPr>
         <p:spPr/>
         <p:txBody>
-          <a:bodyPr>
+          <a:bodyPr/>
+          <a:lstStyle/>
+          <a:p>
+            <a:r>
+              <a:rPr lang="en-GB" sz="3600" dirty="0"/>
+              <a:t>Interaction in this workshop</a:t>
+            </a:r>
+          </a:p>
+        </p:txBody>
+      </p:sp>
+      <p:sp>
+        <p:nvSpPr>
+          <p:cNvPr id="3" name="Text Placeholder 2"/>
+          <p:cNvSpPr>
+            <a:spLocks noGrp="1"/>
+          </p:cNvSpPr>
+          <p:nvPr>
+            <p:ph type="body" sz="quarter" idx="13"/>
+          </p:nvPr>
+        </p:nvSpPr>
+        <p:spPr/>
+        <p:txBody>
+          <a:bodyPr vert="horz" lIns="91440" tIns="45720" rIns="91440" bIns="45720" rtlCol="0" anchor="t">
             <a:noAutofit/>
           </a:bodyPr>
           <a:lstStyle/>
           <a:p>
             <a:r>
-              <a:rPr lang="en-GB" sz="3600" dirty="0"/>
-              <a:t>Can you hear us?</a:t>
-            </a:r>
-          </a:p>
-        </p:txBody>
-      </p:sp>
-      <p:sp>
-        <p:nvSpPr>
-          <p:cNvPr id="4" name="Oval Callout 3">
-            <a:extLst>
-              <a:ext uri="{C183D7F6-B498-43B3-948B-1728B52AA6E4}">
-                <adec:decorative xmlns:adec="http://schemas.microsoft.com/office/drawing/2017/decorative" val="1"/>
-              </a:ext>
-            </a:extLst>
-          </p:cNvPr>
-          <p:cNvSpPr/>
-          <p:nvPr/>
-        </p:nvSpPr>
-        <p:spPr>
-          <a:xfrm>
-            <a:off x="4081562" y="2065552"/>
-            <a:ext cx="3965158" cy="3038463"/>
-          </a:xfrm>
-          <a:prstGeom prst="wedgeEllipseCallout">
-            <a:avLst/>
-          </a:prstGeom>
-          <a:gradFill>
-            <a:gsLst>
-              <a:gs pos="49000">
-                <a:schemeClr val="tx1"/>
-              </a:gs>
-              <a:gs pos="100000">
-                <a:schemeClr val="bg1"/>
-              </a:gs>
-              <a:gs pos="100000">
-                <a:schemeClr val="bg1"/>
-              </a:gs>
-              <a:gs pos="100000">
-                <a:schemeClr val="bg1"/>
-              </a:gs>
-            </a:gsLst>
-            <a:lin ang="5400000" scaled="1"/>
-          </a:gradFill>
-          <a:ln>
-            <a:noFill/>
-          </a:ln>
-        </p:spPr>
-        <p:style>
-          <a:lnRef idx="2">
-            <a:schemeClr val="accent1">
-              <a:shade val="50000"/>
-            </a:schemeClr>
-          </a:lnRef>
-          <a:fillRef idx="1">
-            <a:schemeClr val="accent1"/>
-          </a:fillRef>
-          <a:effectRef idx="0">
-            <a:schemeClr val="accent1"/>
-          </a:effectRef>
-          <a:fontRef idx="minor">
-            <a:schemeClr val="lt1"/>
-          </a:fontRef>
-        </p:style>
-        <p:txBody>
-          <a:bodyPr rtlCol="0" anchor="ctr"/>
-          <a:lstStyle/>
-          <a:p>
-            <a:pPr algn="ctr"/>
-            <a:r>
-              <a:rPr lang="en-GB" sz="8000" dirty="0"/>
-              <a:t>?</a:t>
-            </a:r>
-          </a:p>
-        </p:txBody>
-      </p:sp>
-      <p:sp>
-        <p:nvSpPr>
-          <p:cNvPr id="2" name="Slide Number Placeholder 1"/>
+              <a:rPr lang="en-GB" sz="3200" dirty="0">
+                <a:latin typeface="+mn-lt"/>
+                <a:cs typeface="Arial"/>
+              </a:rPr>
+              <a:t>Zoom chat -&gt; technical questions for facilitator</a:t>
+            </a:r>
+          </a:p>
+          <a:p>
+            <a:r>
+              <a:rPr lang="en-GB" sz="3200" dirty="0">
+                <a:latin typeface="+mn-lt"/>
+                <a:cs typeface="Arial"/>
+              </a:rPr>
+              <a:t>Zoom Q&amp;A -&gt; content questions for the host, upvote questions of others</a:t>
+            </a:r>
+          </a:p>
+        </p:txBody>
+      </p:sp>
+      <p:sp>
+        <p:nvSpPr>
+          <p:cNvPr id="4" name="Slide Number Placeholder 3"/>
           <p:cNvSpPr>
             <a:spLocks noGrp="1"/>
           </p:cNvSpPr>
@@ -11058,7 +10708,7 @@
     </p:spTree>
     <p:extLst>
       <p:ext uri="{BB962C8B-B14F-4D97-AF65-F5344CB8AC3E}">
-        <p14:creationId xmlns:p14="http://schemas.microsoft.com/office/powerpoint/2010/main" val="2325164146"/>
+        <p14:creationId xmlns:p14="http://schemas.microsoft.com/office/powerpoint/2010/main" val="3795667852"/>
       </p:ext>
     </p:extLst>
   </p:cSld>
@@ -11087,7 +10737,13 @@
       </p:grpSpPr>
       <p:sp>
         <p:nvSpPr>
-          <p:cNvPr id="2" name="Title 1"/>
+          <p:cNvPr id="2" name="Title 1">
+            <a:extLst>
+              <a:ext uri="{FF2B5EF4-FFF2-40B4-BE49-F238E27FC236}">
+                <a16:creationId xmlns:a16="http://schemas.microsoft.com/office/drawing/2014/main" id="{DBAABAB6-12C5-49C1-88DA-89359102CCFA}"/>
+              </a:ext>
+            </a:extLst>
+          </p:cNvPr>
           <p:cNvSpPr>
             <a:spLocks noGrp="1"/>
           </p:cNvSpPr>
@@ -11101,15 +10757,25 @@
           <a:lstStyle/>
           <a:p>
             <a:r>
-              <a:rPr lang="en-GB" sz="3600" dirty="0"/>
-              <a:t>Troubleshooting audio problems</a:t>
-            </a:r>
-          </a:p>
-        </p:txBody>
-      </p:sp>
-      <p:sp>
-        <p:nvSpPr>
-          <p:cNvPr id="3" name="Text Placeholder 2"/>
+              <a:rPr lang="en-GB" sz="3600" dirty="0">
+                <a:latin typeface="Arial"/>
+                <a:cs typeface="Arial"/>
+              </a:rPr>
+              <a:t>You might be interested in other UKDS events</a:t>
+            </a:r>
+            <a:endParaRPr lang="en-GB" dirty="0"/>
+          </a:p>
+        </p:txBody>
+      </p:sp>
+      <p:sp>
+        <p:nvSpPr>
+          <p:cNvPr id="3" name="Text Placeholder 2">
+            <a:extLst>
+              <a:ext uri="{FF2B5EF4-FFF2-40B4-BE49-F238E27FC236}">
+                <a16:creationId xmlns:a16="http://schemas.microsoft.com/office/drawing/2014/main" id="{BD06EB3D-71B2-40D9-9E11-89DDD37BB242}"/>
+              </a:ext>
+            </a:extLst>
+          </p:cNvPr>
           <p:cNvSpPr>
             <a:spLocks noGrp="1"/>
           </p:cNvSpPr>
@@ -11119,48 +10785,102 @@
         </p:nvSpPr>
         <p:spPr/>
         <p:txBody>
-          <a:bodyPr>
-            <a:normAutofit/>
+          <a:bodyPr vert="horz" lIns="91440" tIns="45720" rIns="91440" bIns="45720" rtlCol="0" anchor="t">
+            <a:noAutofit/>
           </a:bodyPr>
           <a:lstStyle/>
           <a:p>
             <a:r>
-              <a:rPr lang="en-GB" sz="3200" dirty="0"/>
-              <a:t>Check your speaker/headset is plugged in / volume is on.</a:t>
-            </a:r>
-          </a:p>
-          <a:p>
-            <a:r>
-              <a:rPr lang="en-GB" sz="3200" dirty="0"/>
-              <a:t>Click on audio to change to listening via phone</a:t>
-            </a:r>
-          </a:p>
-          <a:p>
-            <a:r>
-              <a:rPr lang="en-GB" sz="3200" dirty="0"/>
-              <a:t>We are recording this workshop and will post it on YouTube (also live streaming there now)</a:t>
-            </a:r>
-          </a:p>
-          <a:p>
-            <a:pPr marL="0" indent="0">
-              <a:buNone/>
-            </a:pPr>
-            <a:r>
-              <a:rPr lang="en-GB" sz="3000" dirty="0"/>
-              <a:t>(https://www.youtube.com/user/UKDATASERVICE)</a:t>
-            </a:r>
-          </a:p>
-          <a:p>
-            <a:pPr marL="0" indent="0">
-              <a:buNone/>
-            </a:pPr>
-            <a:endParaRPr lang="en-GB" sz="3200" dirty="0"/>
-          </a:p>
-        </p:txBody>
-      </p:sp>
-      <p:sp>
-        <p:nvSpPr>
-          <p:cNvPr id="4" name="Slide Number Placeholder 3"/>
+              <a:rPr lang="en-GB" sz="3200" dirty="0">
+                <a:latin typeface="Arial"/>
+                <a:cs typeface="Arial"/>
+              </a:rPr>
+              <a:t>ABM workshop on running experiments - Feb 16</a:t>
+            </a:r>
+          </a:p>
+          <a:p>
+            <a:r>
+              <a:rPr lang="en-GB" sz="3200" dirty="0">
+                <a:latin typeface="Arial"/>
+                <a:cs typeface="Arial"/>
+              </a:rPr>
+              <a:t>ABM guest researcher seminar - Mar 9</a:t>
+            </a:r>
+            <a:endParaRPr lang="en-US" sz="3200" dirty="0"/>
+          </a:p>
+          <a:p>
+            <a:r>
+              <a:rPr lang="en-GB" sz="3200" dirty="0">
+                <a:latin typeface="Arial"/>
+                <a:cs typeface="Arial"/>
+              </a:rPr>
+              <a:t>CSS Drop-ins – Every 2</a:t>
+            </a:r>
+            <a:r>
+              <a:rPr lang="en-GB" sz="3200" baseline="30000" dirty="0">
+                <a:latin typeface="Arial"/>
+                <a:cs typeface="Arial"/>
+              </a:rPr>
+              <a:t>nd</a:t>
+            </a:r>
+            <a:r>
+              <a:rPr lang="en-GB" sz="3200" dirty="0">
+                <a:latin typeface="Arial"/>
+                <a:cs typeface="Arial"/>
+              </a:rPr>
+              <a:t> Tuesday of month at 13:00</a:t>
+            </a:r>
+            <a:endParaRPr lang="en-US" sz="3200" dirty="0"/>
+          </a:p>
+          <a:p>
+            <a:endParaRPr lang="en-GB" sz="3200" dirty="0">
+              <a:latin typeface="Arial"/>
+              <a:cs typeface="Arial"/>
+              <a:hlinkClick r:id="rId2"/>
+            </a:endParaRPr>
+          </a:p>
+          <a:p>
+            <a:r>
+              <a:rPr lang="en-GB" sz="3000" dirty="0">
+                <a:latin typeface="Arial"/>
+                <a:cs typeface="Arial"/>
+                <a:hlinkClick r:id="rId2"/>
+              </a:rPr>
+              <a:t>https://ukdataservice.ac.uk/news-and-events/events.aspx</a:t>
+            </a:r>
+            <a:r>
+              <a:rPr lang="en-GB" sz="3000" dirty="0">
+                <a:latin typeface="Arial"/>
+                <a:cs typeface="Arial"/>
+              </a:rPr>
+              <a:t> </a:t>
+            </a:r>
+          </a:p>
+          <a:p>
+            <a:r>
+              <a:rPr lang="en-GB" sz="3000" dirty="0">
+                <a:latin typeface="Arial"/>
+                <a:cs typeface="Arial"/>
+                <a:hlinkClick r:id="rId3"/>
+              </a:rPr>
+              <a:t>https://www.ukdataservice.ac.uk/news-and-events/events/past-events.aspx</a:t>
+            </a:r>
+            <a:endParaRPr lang="en-GB" sz="3000" dirty="0">
+              <a:latin typeface="Arial"/>
+              <a:cs typeface="Arial"/>
+            </a:endParaRPr>
+          </a:p>
+        </p:txBody>
+      </p:sp>
+      <p:sp>
+        <p:nvSpPr>
+          <p:cNvPr id="4" name="Slide Number Placeholder 3">
+            <a:extLst>
+              <a:ext uri="{FF2B5EF4-FFF2-40B4-BE49-F238E27FC236}">
+                <a16:creationId xmlns:a16="http://schemas.microsoft.com/office/drawing/2014/main" id="{FD34B16C-AEDD-4330-B895-9D81BF3A1953}"/>
+              </a:ext>
+            </a:extLst>
+          </p:cNvPr>
           <p:cNvSpPr>
             <a:spLocks noGrp="1"/>
           </p:cNvSpPr>
@@ -11184,7 +10904,7 @@
     </p:spTree>
     <p:extLst>
       <p:ext uri="{BB962C8B-B14F-4D97-AF65-F5344CB8AC3E}">
-        <p14:creationId xmlns:p14="http://schemas.microsoft.com/office/powerpoint/2010/main" val="2198104458"/>
+        <p14:creationId xmlns:p14="http://schemas.microsoft.com/office/powerpoint/2010/main" val="3409095182"/>
       </p:ext>
     </p:extLst>
   </p:cSld>
@@ -11233,202 +10953,6 @@
           <a:lstStyle/>
           <a:p>
             <a:r>
-              <a:rPr lang="en-GB" sz="3600" dirty="0">
-                <a:latin typeface="Arial"/>
-                <a:cs typeface="Arial"/>
-              </a:rPr>
-              <a:t>You might be interested in other UKDS events</a:t>
-            </a:r>
-            <a:endParaRPr lang="en-GB" dirty="0"/>
-          </a:p>
-        </p:txBody>
-      </p:sp>
-      <p:sp>
-        <p:nvSpPr>
-          <p:cNvPr id="3" name="Text Placeholder 2">
-            <a:extLst>
-              <a:ext uri="{FF2B5EF4-FFF2-40B4-BE49-F238E27FC236}">
-                <a16:creationId xmlns:a16="http://schemas.microsoft.com/office/drawing/2014/main" id="{BD06EB3D-71B2-40D9-9E11-89DDD37BB242}"/>
-              </a:ext>
-            </a:extLst>
-          </p:cNvPr>
-          <p:cNvSpPr>
-            <a:spLocks noGrp="1"/>
-          </p:cNvSpPr>
-          <p:nvPr>
-            <p:ph type="body" sz="quarter" idx="13"/>
-          </p:nvPr>
-        </p:nvSpPr>
-        <p:spPr/>
-        <p:txBody>
-          <a:bodyPr vert="horz" lIns="91440" tIns="45720" rIns="91440" bIns="45720" rtlCol="0" anchor="t">
-            <a:noAutofit/>
-          </a:bodyPr>
-          <a:lstStyle/>
-          <a:p>
-            <a:r>
-              <a:rPr lang="en-GB" sz="3200" dirty="0">
-                <a:latin typeface="Arial"/>
-                <a:cs typeface="Arial"/>
-              </a:rPr>
-              <a:t>ABM workshop on running experiments - Feb 16</a:t>
-            </a:r>
-          </a:p>
-          <a:p>
-            <a:r>
-              <a:rPr lang="en-GB" sz="3200" dirty="0">
-                <a:latin typeface="Arial"/>
-                <a:cs typeface="Arial"/>
-              </a:rPr>
-              <a:t>ABM guest researcher seminar - Mar 9</a:t>
-            </a:r>
-            <a:endParaRPr lang="en-US" sz="3200" dirty="0"/>
-          </a:p>
-          <a:p>
-            <a:r>
-              <a:rPr lang="en-GB" sz="3200" dirty="0">
-                <a:latin typeface="Arial"/>
-                <a:cs typeface="Arial"/>
-              </a:rPr>
-              <a:t>CSS Drop-ins – Every 2</a:t>
-            </a:r>
-            <a:r>
-              <a:rPr lang="en-GB" sz="3200" baseline="30000" dirty="0">
-                <a:latin typeface="Arial"/>
-                <a:cs typeface="Arial"/>
-              </a:rPr>
-              <a:t>nd</a:t>
-            </a:r>
-            <a:r>
-              <a:rPr lang="en-GB" sz="3200" dirty="0">
-                <a:latin typeface="Arial"/>
-                <a:cs typeface="Arial"/>
-              </a:rPr>
-              <a:t> Tuesday of month at 13:00</a:t>
-            </a:r>
-            <a:endParaRPr lang="en-US" sz="3200" dirty="0"/>
-          </a:p>
-          <a:p>
-            <a:endParaRPr lang="en-GB" sz="3200" dirty="0">
-              <a:latin typeface="Arial"/>
-              <a:cs typeface="Arial"/>
-              <a:hlinkClick r:id="rId2"/>
-            </a:endParaRPr>
-          </a:p>
-          <a:p>
-            <a:r>
-              <a:rPr lang="en-GB" sz="3000" dirty="0">
-                <a:latin typeface="Arial"/>
-                <a:cs typeface="Arial"/>
-                <a:hlinkClick r:id="rId2"/>
-              </a:rPr>
-              <a:t>https://ukdataservice.ac.uk/news-and-events/events.aspx</a:t>
-            </a:r>
-            <a:r>
-              <a:rPr lang="en-GB" sz="3000" dirty="0">
-                <a:latin typeface="Arial"/>
-                <a:cs typeface="Arial"/>
-              </a:rPr>
-              <a:t> </a:t>
-            </a:r>
-          </a:p>
-          <a:p>
-            <a:r>
-              <a:rPr lang="en-GB" sz="3000" dirty="0">
-                <a:latin typeface="Arial"/>
-                <a:cs typeface="Arial"/>
-                <a:hlinkClick r:id="rId3"/>
-              </a:rPr>
-              <a:t>https://www.ukdataservice.ac.uk/news-and-events/events/past-events.aspx</a:t>
-            </a:r>
-            <a:endParaRPr lang="en-GB" sz="3000" dirty="0">
-              <a:latin typeface="Arial"/>
-              <a:cs typeface="Arial"/>
-            </a:endParaRPr>
-          </a:p>
-        </p:txBody>
-      </p:sp>
-      <p:sp>
-        <p:nvSpPr>
-          <p:cNvPr id="4" name="Slide Number Placeholder 3">
-            <a:extLst>
-              <a:ext uri="{FF2B5EF4-FFF2-40B4-BE49-F238E27FC236}">
-                <a16:creationId xmlns:a16="http://schemas.microsoft.com/office/drawing/2014/main" id="{FD34B16C-AEDD-4330-B895-9D81BF3A1953}"/>
-              </a:ext>
-            </a:extLst>
-          </p:cNvPr>
-          <p:cNvSpPr>
-            <a:spLocks noGrp="1"/>
-          </p:cNvSpPr>
-          <p:nvPr>
-            <p:ph type="sldNum" sz="quarter" idx="12"/>
-          </p:nvPr>
-        </p:nvSpPr>
-        <p:spPr/>
-        <p:txBody>
-          <a:bodyPr/>
-          <a:lstStyle/>
-          <a:p>
-            <a:fld id="{016687C5-7511-7743-B429-3BDBE272F28B}" type="slidenum">
-              <a:rPr lang="en-US" smtClean="0"/>
-              <a:t>5</a:t>
-            </a:fld>
-            <a:endParaRPr lang="en-US"/>
-          </a:p>
-        </p:txBody>
-      </p:sp>
-    </p:spTree>
-    <p:extLst>
-      <p:ext uri="{BB962C8B-B14F-4D97-AF65-F5344CB8AC3E}">
-        <p14:creationId xmlns:p14="http://schemas.microsoft.com/office/powerpoint/2010/main" val="3409095182"/>
-      </p:ext>
-    </p:extLst>
-  </p:cSld>
-  <p:clrMapOvr>
-    <a:masterClrMapping/>
-  </p:clrMapOvr>
-</p:sld>
-</file>
-
-<file path=ppt/slides/slide6.xml><?xml version="1.0" encoding="utf-8"?>
-<p:sld xmlns:a="http://schemas.openxmlformats.org/drawingml/2006/main" xmlns:r="http://schemas.openxmlformats.org/officeDocument/2006/relationships" xmlns:p="http://schemas.openxmlformats.org/presentationml/2006/main">
-  <p:cSld>
-    <p:spTree>
-      <p:nvGrpSpPr>
-        <p:cNvPr id="1" name=""/>
-        <p:cNvGrpSpPr/>
-        <p:nvPr/>
-      </p:nvGrpSpPr>
-      <p:grpSpPr>
-        <a:xfrm>
-          <a:off x="0" y="0"/>
-          <a:ext cx="0" cy="0"/>
-          <a:chOff x="0" y="0"/>
-          <a:chExt cx="0" cy="0"/>
-        </a:xfrm>
-      </p:grpSpPr>
-      <p:sp>
-        <p:nvSpPr>
-          <p:cNvPr id="2" name="Title 1">
-            <a:extLst>
-              <a:ext uri="{FF2B5EF4-FFF2-40B4-BE49-F238E27FC236}">
-                <a16:creationId xmlns:a16="http://schemas.microsoft.com/office/drawing/2014/main" id="{DBAABAB6-12C5-49C1-88DA-89359102CCFA}"/>
-              </a:ext>
-            </a:extLst>
-          </p:cNvPr>
-          <p:cNvSpPr>
-            <a:spLocks noGrp="1"/>
-          </p:cNvSpPr>
-          <p:nvPr>
-            <p:ph type="title"/>
-          </p:nvPr>
-        </p:nvSpPr>
-        <p:spPr/>
-        <p:txBody>
-          <a:bodyPr/>
-          <a:lstStyle/>
-          <a:p>
-            <a:r>
               <a:rPr lang="en-GB" dirty="0"/>
               <a:t>Table of contents</a:t>
             </a:r>
@@ -11661,7 +11185,7 @@
           <a:p>
             <a:fld id="{016687C5-7511-7743-B429-3BDBE272F28B}" type="slidenum">
               <a:rPr lang="en-US" smtClean="0"/>
-              <a:t>6</a:t>
+              <a:t>5</a:t>
             </a:fld>
             <a:endParaRPr lang="en-US"/>
           </a:p>
@@ -11680,7 +11204,7 @@
 </p:sld>
 </file>
 
-<file path=ppt/slides/slide7.xml><?xml version="1.0" encoding="utf-8"?>
+<file path=ppt/slides/slide6.xml><?xml version="1.0" encoding="utf-8"?>
 <p:sld xmlns:a="http://schemas.openxmlformats.org/drawingml/2006/main" xmlns:r="http://schemas.openxmlformats.org/officeDocument/2006/relationships" xmlns:p="http://schemas.openxmlformats.org/presentationml/2006/main">
   <p:cSld>
     <p:spTree>
@@ -12010,7 +11534,7 @@
                   <a:spcPts val="600"/>
                 </a:spcAft>
               </a:pPr>
-              <a:t>7</a:t>
+              <a:t>6</a:t>
             </a:fld>
             <a:endParaRPr lang="en-US"/>
           </a:p>
@@ -12157,7 +11681,7 @@
 </p:sld>
 </file>
 
-<file path=ppt/slides/slide8.xml><?xml version="1.0" encoding="utf-8"?>
+<file path=ppt/slides/slide7.xml><?xml version="1.0" encoding="utf-8"?>
 <p:sld xmlns:a="http://schemas.openxmlformats.org/drawingml/2006/main" xmlns:r="http://schemas.openxmlformats.org/officeDocument/2006/relationships" xmlns:p="http://schemas.openxmlformats.org/presentationml/2006/main">
   <p:cSld>
     <p:spTree>
@@ -12241,7 +11765,7 @@
                   </a:extLst>
                 </a:hlinkClick>
               </a:rPr>
-              <a:t>julia.kasmire@manchester.ac.uk</a:t>
+              <a:t>j.kasmire@manchester.ac.uk</a:t>
             </a:r>
             <a:endParaRPr lang="en-GB" sz="2000" u="sng" dirty="0">
               <a:solidFill>
@@ -12281,7 +11805,13 @@
       </p:sp>
       <p:sp>
         <p:nvSpPr>
-          <p:cNvPr id="4" name="Slide Number Placeholder 3"/>
+          <p:cNvPr id="4" name="Slide Number Placeholder 3">
+            <a:extLst>
+              <a:ext uri="{C183D7F6-B498-43B3-948B-1728B52AA6E4}">
+                <adec:decorative xmlns:adec="http://schemas.microsoft.com/office/drawing/2017/decorative" val="1"/>
+              </a:ext>
+            </a:extLst>
+          </p:cNvPr>
           <p:cNvSpPr>
             <a:spLocks noGrp="1"/>
           </p:cNvSpPr>
@@ -12296,7 +11826,7 @@
           <a:p>
             <a:fld id="{016687C5-7511-7743-B429-3BDBE272F28B}" type="slidenum">
               <a:rPr lang="en-US" smtClean="0"/>
-              <a:t>8</a:t>
+              <a:t>7</a:t>
             </a:fld>
             <a:endParaRPr lang="en-US"/>
           </a:p>
@@ -12403,10 +11933,13 @@
       </p:grpSp>
       <p:pic>
         <p:nvPicPr>
-          <p:cNvPr id="9" name="Picture 8" descr="Twitter">
+          <p:cNvPr id="9" name="Picture 8">
             <a:extLst>
               <a:ext uri="{FF2B5EF4-FFF2-40B4-BE49-F238E27FC236}">
                 <a16:creationId xmlns:a16="http://schemas.microsoft.com/office/drawing/2014/main" id="{BAA8C234-6209-46A8-BF56-AF579060A4A9}"/>
+              </a:ext>
+              <a:ext uri="{C183D7F6-B498-43B3-948B-1728B52AA6E4}">
+                <adec:decorative xmlns:adec="http://schemas.microsoft.com/office/drawing/2017/decorative" val="1"/>
               </a:ext>
             </a:extLst>
           </p:cNvPr>
@@ -13208,21 +12741,6 @@
 </file>
 
 <file path=customXml/item1.xml><?xml version="1.0" encoding="utf-8"?>
-<?mso-contentType ?>
-<FormTemplates xmlns="http://schemas.microsoft.com/sharepoint/v3/contenttype/forms">
-  <Display>DocumentLibraryForm</Display>
-  <Edit>DocumentLibraryForm</Edit>
-  <New>DocumentLibraryForm</New>
-</FormTemplates>
-</file>
-
-<file path=customXml/item2.xml><?xml version="1.0" encoding="utf-8"?>
-<p:properties xmlns:p="http://schemas.microsoft.com/office/2006/metadata/properties" xmlns:xsi="http://www.w3.org/2001/XMLSchema-instance" xmlns:pc="http://schemas.microsoft.com/office/infopath/2007/PartnerControls">
-  <documentManagement/>
-</p:properties>
-</file>
-
-<file path=customXml/item3.xml><?xml version="1.0" encoding="utf-8"?>
 <ct:contentTypeSchema xmlns:ct="http://schemas.microsoft.com/office/2006/metadata/contentType" xmlns:ma="http://schemas.microsoft.com/office/2006/metadata/properties/metaAttributes" ct:_="" ma:_="" ma:contentTypeName="Document" ma:contentTypeID="0x01010082D5F373B85FCF47AAFC80BC7D80700A" ma:contentTypeVersion="13" ma:contentTypeDescription="Create a new document." ma:contentTypeScope="" ma:versionID="a5b55bbc0f30dd09a013d653378de863">
   <xsd:schema xmlns:xsd="http://www.w3.org/2001/XMLSchema" xmlns:xs="http://www.w3.org/2001/XMLSchema" xmlns:p="http://schemas.microsoft.com/office/2006/metadata/properties" xmlns:ns2="28b91107-4a81-451c-84f7-f52706813e27" xmlns:ns3="1d2e6339-9963-4444-b0f2-be5dad007de0" targetNamespace="http://schemas.microsoft.com/office/2006/metadata/properties" ma:root="true" ma:fieldsID="acc4db7ff3478e5e9f5534b78202516d" ns2:_="" ns3:_="">
     <xsd:import namespace="28b91107-4a81-451c-84f7-f52706813e27"/>
@@ -13445,10 +12963,36 @@
 </ct:contentTypeSchema>
 </file>
 
+<file path=customXml/item2.xml><?xml version="1.0" encoding="utf-8"?>
+<p:properties xmlns:p="http://schemas.microsoft.com/office/2006/metadata/properties" xmlns:xsi="http://www.w3.org/2001/XMLSchema-instance" xmlns:pc="http://schemas.microsoft.com/office/infopath/2007/PartnerControls">
+  <documentManagement/>
+</p:properties>
+</file>
+
+<file path=customXml/item3.xml><?xml version="1.0" encoding="utf-8"?>
+<?mso-contentType ?>
+<FormTemplates xmlns="http://schemas.microsoft.com/sharepoint/v3/contenttype/forms">
+  <Display>DocumentLibraryForm</Display>
+  <Edit>DocumentLibraryForm</Edit>
+  <New>DocumentLibraryForm</New>
+</FormTemplates>
+</file>
+
 <file path=customXml/itemProps1.xml><?xml version="1.0" encoding="utf-8"?>
-<ds:datastoreItem xmlns:ds="http://schemas.openxmlformats.org/officeDocument/2006/customXml" ds:itemID="{EE6A3BF6-5E26-4764-BA80-8BC242DCD14D}">
+<ds:datastoreItem xmlns:ds="http://schemas.openxmlformats.org/officeDocument/2006/customXml" ds:itemID="{E7DA82B1-EE99-4689-9282-FB1FEC986EE5}">
   <ds:schemaRefs>
-    <ds:schemaRef ds:uri="http://schemas.microsoft.com/sharepoint/v3/contenttype/forms"/>
+    <ds:schemaRef ds:uri="http://schemas.microsoft.com/office/2006/metadata/contentType"/>
+    <ds:schemaRef ds:uri="http://schemas.microsoft.com/office/2006/metadata/properties/metaAttributes"/>
+    <ds:schemaRef ds:uri="http://www.w3.org/2001/XMLSchema"/>
+    <ds:schemaRef ds:uri="http://schemas.microsoft.com/office/2006/metadata/properties"/>
+    <ds:schemaRef ds:uri="28b91107-4a81-451c-84f7-f52706813e27"/>
+    <ds:schemaRef ds:uri="1d2e6339-9963-4444-b0f2-be5dad007de0"/>
+    <ds:schemaRef ds:uri="http://schemas.microsoft.com/office/2006/documentManagement/types"/>
+    <ds:schemaRef ds:uri="http://schemas.microsoft.com/office/infopath/2007/PartnerControls"/>
+    <ds:schemaRef ds:uri="http://schemas.openxmlformats.org/package/2006/metadata/core-properties"/>
+    <ds:schemaRef ds:uri="http://purl.org/dc/elements/1.1/"/>
+    <ds:schemaRef ds:uri="http://purl.org/dc/terms/"/>
+    <ds:schemaRef ds:uri="http://schemas.microsoft.com/internal/obd"/>
   </ds:schemaRefs>
 </ds:datastoreItem>
 </file>
@@ -13471,20 +13015,9 @@
 </file>
 
 <file path=customXml/itemProps3.xml><?xml version="1.0" encoding="utf-8"?>
-<ds:datastoreItem xmlns:ds="http://schemas.openxmlformats.org/officeDocument/2006/customXml" ds:itemID="{E7DA82B1-EE99-4689-9282-FB1FEC986EE5}">
+<ds:datastoreItem xmlns:ds="http://schemas.openxmlformats.org/officeDocument/2006/customXml" ds:itemID="{EE6A3BF6-5E26-4764-BA80-8BC242DCD14D}">
   <ds:schemaRefs>
-    <ds:schemaRef ds:uri="http://schemas.microsoft.com/office/2006/metadata/contentType"/>
-    <ds:schemaRef ds:uri="http://schemas.microsoft.com/office/2006/metadata/properties/metaAttributes"/>
-    <ds:schemaRef ds:uri="http://www.w3.org/2001/XMLSchema"/>
-    <ds:schemaRef ds:uri="http://schemas.microsoft.com/office/2006/metadata/properties"/>
-    <ds:schemaRef ds:uri="28b91107-4a81-451c-84f7-f52706813e27"/>
-    <ds:schemaRef ds:uri="1d2e6339-9963-4444-b0f2-be5dad007de0"/>
-    <ds:schemaRef ds:uri="http://schemas.microsoft.com/office/2006/documentManagement/types"/>
-    <ds:schemaRef ds:uri="http://schemas.microsoft.com/office/infopath/2007/PartnerControls"/>
-    <ds:schemaRef ds:uri="http://schemas.openxmlformats.org/package/2006/metadata/core-properties"/>
-    <ds:schemaRef ds:uri="http://purl.org/dc/elements/1.1/"/>
-    <ds:schemaRef ds:uri="http://purl.org/dc/terms/"/>
-    <ds:schemaRef ds:uri="http://schemas.microsoft.com/internal/obd"/>
+    <ds:schemaRef ds:uri="http://schemas.microsoft.com/sharepoint/v3/contenttype/forms"/>
   </ds:schemaRefs>
 </ds:datastoreItem>
 </file>
</xml_diff>